<commit_message>
Added algorithms and edited one more image.
</commit_message>
<xml_diff>
--- a/IROS17/pictures/pdf/Reflection.pptx
+++ b/IROS17/pictures/pdf/Reflection.pptx
@@ -288,7 +288,7 @@
           <a:p>
             <a:fld id="{E46B84FF-1CFF-E849-8ACF-6EE548EC4909}" type="datetimeFigureOut">
               <a:rPr lang="en-US" smtClean="0"/>
-              <a:t>2/24/17</a:t>
+              <a:t>2/27/17</a:t>
             </a:fld>
             <a:endParaRPr lang="en-US"/>
           </a:p>
@@ -458,7 +458,7 @@
           <a:p>
             <a:fld id="{E46B84FF-1CFF-E849-8ACF-6EE548EC4909}" type="datetimeFigureOut">
               <a:rPr lang="en-US" smtClean="0"/>
-              <a:t>2/24/17</a:t>
+              <a:t>2/27/17</a:t>
             </a:fld>
             <a:endParaRPr lang="en-US"/>
           </a:p>
@@ -638,7 +638,7 @@
           <a:p>
             <a:fld id="{E46B84FF-1CFF-E849-8ACF-6EE548EC4909}" type="datetimeFigureOut">
               <a:rPr lang="en-US" smtClean="0"/>
-              <a:t>2/24/17</a:t>
+              <a:t>2/27/17</a:t>
             </a:fld>
             <a:endParaRPr lang="en-US"/>
           </a:p>
@@ -808,7 +808,7 @@
           <a:p>
             <a:fld id="{E46B84FF-1CFF-E849-8ACF-6EE548EC4909}" type="datetimeFigureOut">
               <a:rPr lang="en-US" smtClean="0"/>
-              <a:t>2/24/17</a:t>
+              <a:t>2/27/17</a:t>
             </a:fld>
             <a:endParaRPr lang="en-US"/>
           </a:p>
@@ -1054,7 +1054,7 @@
           <a:p>
             <a:fld id="{E46B84FF-1CFF-E849-8ACF-6EE548EC4909}" type="datetimeFigureOut">
               <a:rPr lang="en-US" smtClean="0"/>
-              <a:t>2/24/17</a:t>
+              <a:t>2/27/17</a:t>
             </a:fld>
             <a:endParaRPr lang="en-US"/>
           </a:p>
@@ -1342,7 +1342,7 @@
           <a:p>
             <a:fld id="{E46B84FF-1CFF-E849-8ACF-6EE548EC4909}" type="datetimeFigureOut">
               <a:rPr lang="en-US" smtClean="0"/>
-              <a:t>2/24/17</a:t>
+              <a:t>2/27/17</a:t>
             </a:fld>
             <a:endParaRPr lang="en-US"/>
           </a:p>
@@ -1764,7 +1764,7 @@
           <a:p>
             <a:fld id="{E46B84FF-1CFF-E849-8ACF-6EE548EC4909}" type="datetimeFigureOut">
               <a:rPr lang="en-US" smtClean="0"/>
-              <a:t>2/24/17</a:t>
+              <a:t>2/27/17</a:t>
             </a:fld>
             <a:endParaRPr lang="en-US"/>
           </a:p>
@@ -1882,7 +1882,7 @@
           <a:p>
             <a:fld id="{E46B84FF-1CFF-E849-8ACF-6EE548EC4909}" type="datetimeFigureOut">
               <a:rPr lang="en-US" smtClean="0"/>
-              <a:t>2/24/17</a:t>
+              <a:t>2/27/17</a:t>
             </a:fld>
             <a:endParaRPr lang="en-US"/>
           </a:p>
@@ -1977,7 +1977,7 @@
           <a:p>
             <a:fld id="{E46B84FF-1CFF-E849-8ACF-6EE548EC4909}" type="datetimeFigureOut">
               <a:rPr lang="en-US" smtClean="0"/>
-              <a:t>2/24/17</a:t>
+              <a:t>2/27/17</a:t>
             </a:fld>
             <a:endParaRPr lang="en-US"/>
           </a:p>
@@ -2254,7 +2254,7 @@
           <a:p>
             <a:fld id="{E46B84FF-1CFF-E849-8ACF-6EE548EC4909}" type="datetimeFigureOut">
               <a:rPr lang="en-US" smtClean="0"/>
-              <a:t>2/24/17</a:t>
+              <a:t>2/27/17</a:t>
             </a:fld>
             <a:endParaRPr lang="en-US"/>
           </a:p>
@@ -2507,7 +2507,7 @@
           <a:p>
             <a:fld id="{E46B84FF-1CFF-E849-8ACF-6EE548EC4909}" type="datetimeFigureOut">
               <a:rPr lang="en-US" smtClean="0"/>
-              <a:t>2/24/17</a:t>
+              <a:t>2/27/17</a:t>
             </a:fld>
             <a:endParaRPr lang="en-US"/>
           </a:p>
@@ -2720,7 +2720,7 @@
           <a:p>
             <a:fld id="{E46B84FF-1CFF-E849-8ACF-6EE548EC4909}" type="datetimeFigureOut">
               <a:rPr lang="en-US" smtClean="0"/>
-              <a:t>2/24/17</a:t>
+              <a:t>2/27/17</a:t>
             </a:fld>
             <a:endParaRPr lang="en-US"/>
           </a:p>
@@ -3357,9 +3357,13 @@
             <a:p>
               <a:r>
                 <a:rPr lang="en-US" dirty="0" smtClean="0"/>
-                <a:t>m3</a:t>
+                <a:t>m</a:t>
               </a:r>
-              <a:endParaRPr lang="en-US" dirty="0"/>
+              <a:r>
+                <a:rPr lang="en-US" baseline="-25000" dirty="0" smtClean="0"/>
+                <a:t>3</a:t>
+              </a:r>
+              <a:endParaRPr lang="en-US" baseline="-25000" dirty="0"/>
             </a:p>
           </p:txBody>
         </p:sp>
@@ -3387,9 +3391,13 @@
             <a:p>
               <a:r>
                 <a:rPr lang="en-US" dirty="0" smtClean="0"/>
-                <a:t>m2</a:t>
+                <a:t>m</a:t>
               </a:r>
-              <a:endParaRPr lang="en-US" dirty="0"/>
+              <a:r>
+                <a:rPr lang="en-US" baseline="-25000" dirty="0" smtClean="0"/>
+                <a:t>2</a:t>
+              </a:r>
+              <a:endParaRPr lang="en-US" baseline="-25000" dirty="0"/>
             </a:p>
           </p:txBody>
         </p:sp>
@@ -3417,9 +3425,13 @@
             <a:p>
               <a:r>
                 <a:rPr lang="en-US" dirty="0" smtClean="0"/>
-                <a:t>m1</a:t>
+                <a:t>m</a:t>
               </a:r>
-              <a:endParaRPr lang="en-US" dirty="0"/>
+              <a:r>
+                <a:rPr lang="en-US" baseline="-25000" dirty="0" smtClean="0"/>
+                <a:t>1</a:t>
+              </a:r>
+              <a:endParaRPr lang="en-US" baseline="-25000" dirty="0"/>
             </a:p>
           </p:txBody>
         </p:sp>
@@ -3447,9 +3459,13 @@
             <a:p>
               <a:r>
                 <a:rPr lang="en-US" dirty="0" smtClean="0"/>
-                <a:t>m1</a:t>
+                <a:t>m</a:t>
               </a:r>
-              <a:endParaRPr lang="en-US" dirty="0"/>
+              <a:r>
+                <a:rPr lang="en-US" baseline="-25000" dirty="0" smtClean="0"/>
+                <a:t>1</a:t>
+              </a:r>
+              <a:endParaRPr lang="en-US" baseline="-25000" dirty="0"/>
             </a:p>
           </p:txBody>
         </p:sp>
@@ -3477,9 +3493,13 @@
             <a:p>
               <a:r>
                 <a:rPr lang="en-US" dirty="0" smtClean="0"/>
-                <a:t>m3</a:t>
+                <a:t>m</a:t>
               </a:r>
-              <a:endParaRPr lang="en-US" dirty="0"/>
+              <a:r>
+                <a:rPr lang="en-US" baseline="-25000" dirty="0" smtClean="0"/>
+                <a:t>3</a:t>
+              </a:r>
+              <a:endParaRPr lang="en-US" baseline="-25000" dirty="0"/>
             </a:p>
           </p:txBody>
         </p:sp>

</xml_diff>

<commit_message>
The newest version of the TASE paper
</commit_message>
<xml_diff>
--- a/IROS17/pictures/pdf/Reflection.pptx
+++ b/IROS17/pictures/pdf/Reflection.pptx
@@ -288,7 +288,7 @@
           <a:p>
             <a:fld id="{E46B84FF-1CFF-E849-8ACF-6EE548EC4909}" type="datetimeFigureOut">
               <a:rPr lang="en-US" smtClean="0"/>
-              <a:t>2/27/17</a:t>
+              <a:t>3/28/17</a:t>
             </a:fld>
             <a:endParaRPr lang="en-US"/>
           </a:p>
@@ -458,7 +458,7 @@
           <a:p>
             <a:fld id="{E46B84FF-1CFF-E849-8ACF-6EE548EC4909}" type="datetimeFigureOut">
               <a:rPr lang="en-US" smtClean="0"/>
-              <a:t>2/27/17</a:t>
+              <a:t>3/28/17</a:t>
             </a:fld>
             <a:endParaRPr lang="en-US"/>
           </a:p>
@@ -638,7 +638,7 @@
           <a:p>
             <a:fld id="{E46B84FF-1CFF-E849-8ACF-6EE548EC4909}" type="datetimeFigureOut">
               <a:rPr lang="en-US" smtClean="0"/>
-              <a:t>2/27/17</a:t>
+              <a:t>3/28/17</a:t>
             </a:fld>
             <a:endParaRPr lang="en-US"/>
           </a:p>
@@ -808,7 +808,7 @@
           <a:p>
             <a:fld id="{E46B84FF-1CFF-E849-8ACF-6EE548EC4909}" type="datetimeFigureOut">
               <a:rPr lang="en-US" smtClean="0"/>
-              <a:t>2/27/17</a:t>
+              <a:t>3/28/17</a:t>
             </a:fld>
             <a:endParaRPr lang="en-US"/>
           </a:p>
@@ -1054,7 +1054,7 @@
           <a:p>
             <a:fld id="{E46B84FF-1CFF-E849-8ACF-6EE548EC4909}" type="datetimeFigureOut">
               <a:rPr lang="en-US" smtClean="0"/>
-              <a:t>2/27/17</a:t>
+              <a:t>3/28/17</a:t>
             </a:fld>
             <a:endParaRPr lang="en-US"/>
           </a:p>
@@ -1342,7 +1342,7 @@
           <a:p>
             <a:fld id="{E46B84FF-1CFF-E849-8ACF-6EE548EC4909}" type="datetimeFigureOut">
               <a:rPr lang="en-US" smtClean="0"/>
-              <a:t>2/27/17</a:t>
+              <a:t>3/28/17</a:t>
             </a:fld>
             <a:endParaRPr lang="en-US"/>
           </a:p>
@@ -1764,7 +1764,7 @@
           <a:p>
             <a:fld id="{E46B84FF-1CFF-E849-8ACF-6EE548EC4909}" type="datetimeFigureOut">
               <a:rPr lang="en-US" smtClean="0"/>
-              <a:t>2/27/17</a:t>
+              <a:t>3/28/17</a:t>
             </a:fld>
             <a:endParaRPr lang="en-US"/>
           </a:p>
@@ -1882,7 +1882,7 @@
           <a:p>
             <a:fld id="{E46B84FF-1CFF-E849-8ACF-6EE548EC4909}" type="datetimeFigureOut">
               <a:rPr lang="en-US" smtClean="0"/>
-              <a:t>2/27/17</a:t>
+              <a:t>3/28/17</a:t>
             </a:fld>
             <a:endParaRPr lang="en-US"/>
           </a:p>
@@ -1977,7 +1977,7 @@
           <a:p>
             <a:fld id="{E46B84FF-1CFF-E849-8ACF-6EE548EC4909}" type="datetimeFigureOut">
               <a:rPr lang="en-US" smtClean="0"/>
-              <a:t>2/27/17</a:t>
+              <a:t>3/28/17</a:t>
             </a:fld>
             <a:endParaRPr lang="en-US"/>
           </a:p>
@@ -2254,7 +2254,7 @@
           <a:p>
             <a:fld id="{E46B84FF-1CFF-E849-8ACF-6EE548EC4909}" type="datetimeFigureOut">
               <a:rPr lang="en-US" smtClean="0"/>
-              <a:t>2/27/17</a:t>
+              <a:t>3/28/17</a:t>
             </a:fld>
             <a:endParaRPr lang="en-US"/>
           </a:p>
@@ -2507,7 +2507,7 @@
           <a:p>
             <a:fld id="{E46B84FF-1CFF-E849-8ACF-6EE548EC4909}" type="datetimeFigureOut">
               <a:rPr lang="en-US" smtClean="0"/>
-              <a:t>2/27/17</a:t>
+              <a:t>3/28/17</a:t>
             </a:fld>
             <a:endParaRPr lang="en-US"/>
           </a:p>
@@ -2720,7 +2720,7 @@
           <a:p>
             <a:fld id="{E46B84FF-1CFF-E849-8ACF-6EE548EC4909}" type="datetimeFigureOut">
               <a:rPr lang="en-US" smtClean="0"/>
-              <a:t>2/27/17</a:t>
+              <a:t>3/28/17</a:t>
             </a:fld>
             <a:endParaRPr lang="en-US"/>
           </a:p>
@@ -3103,10 +3103,10 @@
         </p:nvGrpSpPr>
         <p:grpSpPr>
           <a:xfrm>
-            <a:off x="-1" y="-1"/>
-            <a:ext cx="8548968" cy="6876143"/>
-            <a:chOff x="-1" y="-1"/>
-            <a:chExt cx="8548968" cy="6876143"/>
+            <a:off x="-1" y="-1137963"/>
+            <a:ext cx="7315201" cy="8014105"/>
+            <a:chOff x="-1" y="-1137963"/>
+            <a:chExt cx="7315201" cy="8014105"/>
           </a:xfrm>
         </p:grpSpPr>
         <p:pic>
@@ -3259,9 +3259,9 @@
             <p:nvPr/>
           </p:nvSpPr>
           <p:spPr>
-            <a:xfrm>
-              <a:off x="4096395" y="1077765"/>
-              <a:ext cx="4452572" cy="646331"/>
+            <a:xfrm rot="16200000">
+              <a:off x="4311335" y="780546"/>
+              <a:ext cx="4452572" cy="615553"/>
             </a:xfrm>
             <a:prstGeom prst="rect">
               <a:avLst/>
@@ -3276,13 +3276,19 @@
             <a:p>
               <a:pPr algn="ctr"/>
               <a:r>
-                <a:rPr lang="en-US" sz="3600" dirty="0" smtClean="0">
+                <a:rPr lang="en-US" sz="3400" b="1" dirty="0" smtClean="0">
+                  <a:effectLst>
+                    <a:reflection dist="76200" dir="5400000" sy="-100000" algn="bl" rotWithShape="0"/>
+                  </a:effectLst>
                   <a:latin typeface="Times New Roman"/>
                   <a:cs typeface="Times New Roman"/>
                 </a:rPr>
                 <a:t>Reflection</a:t>
               </a:r>
-              <a:endParaRPr lang="en-US" sz="3600" dirty="0">
+              <a:endParaRPr lang="en-US" sz="3400" b="1" dirty="0">
+                <a:effectLst>
+                  <a:reflection dist="76200" dir="5400000" sy="-100000" algn="bl" rotWithShape="0"/>
+                </a:effectLst>
                 <a:latin typeface="Times New Roman"/>
                 <a:cs typeface="Times New Roman"/>
               </a:endParaRPr>

</xml_diff>